<commit_message>
final pdf presentation and documentation
</commit_message>
<xml_diff>
--- a/Презентация за проект Flight Manager.pptx
+++ b/Презентация за проект Flight Manager.pptx
@@ -3346,19 +3346,19 @@
             </a:r>
             <a:r>
               <a:rPr lang="bg-BG" dirty="0" smtClean="0"/>
-              <a:t>програма</a:t>
+              <a:t>програмата </a:t>
+            </a:r>
+            <a:r>
+              <a:rPr lang="bg-BG" dirty="0"/>
+              <a:t>се добавят потребители от администраторски профил, създават се полети и могат да се създават резервации без </a:t>
             </a:r>
             <a:r>
               <a:rPr lang="bg-BG" dirty="0" smtClean="0"/>
-              <a:t>та</a:t>
-            </a:r>
-            <a:r>
-              <a:rPr lang="bg-BG" dirty="0" smtClean="0"/>
-              <a:t> </a:t>
+              <a:t>потребителски </a:t>
             </a:r>
             <a:r>
               <a:rPr lang="bg-BG" dirty="0"/>
-              <a:t>се добавят потребители от администраторски профил, създават се полети и могат да се създават резервации без потребилтелски вход. </a:t>
+              <a:t>вход. </a:t>
             </a:r>
             <a:endParaRPr lang="en-US" dirty="0"/>
           </a:p>
@@ -3858,7 +3858,7 @@
         <p:spPr>
           <a:xfrm>
             <a:off x="6746790" y="3146855"/>
-            <a:ext cx="4942703" cy="1477328"/>
+            <a:ext cx="4942703" cy="1200329"/>
           </a:xfrm>
           <a:prstGeom prst="rect">
             <a:avLst/>
@@ -3921,11 +3921,15 @@
             </a:r>
             <a:r>
               <a:rPr lang="en-US" dirty="0"/>
-              <a:t>Id, Username, Email, Phone number </a:t>
-            </a:r>
-            <a:r>
-              <a:rPr lang="bg-BG" dirty="0"/>
-              <a:t>и се получава грешка, защото имаме 2 еднакви полета.</a:t>
+              <a:t>Id, Username, Email, Phone </a:t>
+            </a:r>
+            <a:r>
+              <a:rPr lang="en-US" dirty="0" smtClean="0"/>
+              <a:t>numbe</a:t>
+            </a:r>
+            <a:r>
+              <a:rPr lang="en-US" dirty="0" smtClean="0"/>
+              <a:t>r.</a:t>
             </a:r>
             <a:endParaRPr lang="en-US" dirty="0"/>
           </a:p>
@@ -4112,15 +4116,7 @@
           <a:p>
             <a:r>
               <a:rPr lang="bg-BG" dirty="0" smtClean="0"/>
-              <a:t>За с</a:t>
-            </a:r>
-            <a:r>
-              <a:rPr lang="bg-BG" dirty="0" smtClean="0"/>
-              <a:t>ъздаване</a:t>
-            </a:r>
-            <a:r>
-              <a:rPr lang="bg-BG" dirty="0" smtClean="0"/>
-              <a:t>:</a:t>
+              <a:t>За създаване:</a:t>
             </a:r>
             <a:endParaRPr lang="en-US" dirty="0"/>
           </a:p>
@@ -4223,11 +4219,7 @@
           <a:p>
             <a:r>
               <a:rPr lang="bg-BG" dirty="0" smtClean="0"/>
-              <a:t>За редактиране</a:t>
-            </a:r>
-            <a:r>
-              <a:rPr lang="bg-BG" dirty="0" smtClean="0"/>
-              <a:t>:</a:t>
+              <a:t>За редактиране:</a:t>
             </a:r>
             <a:endParaRPr lang="en-US" dirty="0"/>
           </a:p>

</xml_diff>